<commit_message>
Implement both scenarios for linear systems
Scenario 1: constant prediction interval. Scenario 2: add vertices only
when take observation. Also add some plotting stuff, e.g., surface
plotting now can check all subdirectories. Generated the dense ground
truth CNIS values, and add a heatmap plot for it for better
illustration.
</commit_message>
<xml_diff>
--- a/BayesOpt Pose Graph-Week14.pptx
+++ b/BayesOpt Pose Graph-Week14.pptx
@@ -273,7 +273,7 @@
           <a:p>
             <a:fld id="{EC1BCD71-190D-426B-85E9-B8B75E5C9734}" type="datetimeFigureOut">
               <a:rPr lang="en-GB" smtClean="0"/>
-              <a:t>09/08/2023</a:t>
+              <a:t>11/08/2023</a:t>
             </a:fld>
             <a:endParaRPr lang="en-GB"/>
           </a:p>
@@ -471,7 +471,7 @@
           <a:p>
             <a:fld id="{EC1BCD71-190D-426B-85E9-B8B75E5C9734}" type="datetimeFigureOut">
               <a:rPr lang="en-GB" smtClean="0"/>
-              <a:t>09/08/2023</a:t>
+              <a:t>11/08/2023</a:t>
             </a:fld>
             <a:endParaRPr lang="en-GB"/>
           </a:p>
@@ -679,7 +679,7 @@
           <a:p>
             <a:fld id="{EC1BCD71-190D-426B-85E9-B8B75E5C9734}" type="datetimeFigureOut">
               <a:rPr lang="en-GB" smtClean="0"/>
-              <a:t>09/08/2023</a:t>
+              <a:t>11/08/2023</a:t>
             </a:fld>
             <a:endParaRPr lang="en-GB"/>
           </a:p>
@@ -877,7 +877,7 @@
           <a:p>
             <a:fld id="{EC1BCD71-190D-426B-85E9-B8B75E5C9734}" type="datetimeFigureOut">
               <a:rPr lang="en-GB" smtClean="0"/>
-              <a:t>09/08/2023</a:t>
+              <a:t>11/08/2023</a:t>
             </a:fld>
             <a:endParaRPr lang="en-GB"/>
           </a:p>
@@ -1152,7 +1152,7 @@
           <a:p>
             <a:fld id="{EC1BCD71-190D-426B-85E9-B8B75E5C9734}" type="datetimeFigureOut">
               <a:rPr lang="en-GB" smtClean="0"/>
-              <a:t>09/08/2023</a:t>
+              <a:t>11/08/2023</a:t>
             </a:fld>
             <a:endParaRPr lang="en-GB"/>
           </a:p>
@@ -1417,7 +1417,7 @@
           <a:p>
             <a:fld id="{EC1BCD71-190D-426B-85E9-B8B75E5C9734}" type="datetimeFigureOut">
               <a:rPr lang="en-GB" smtClean="0"/>
-              <a:t>09/08/2023</a:t>
+              <a:t>11/08/2023</a:t>
             </a:fld>
             <a:endParaRPr lang="en-GB"/>
           </a:p>
@@ -1829,7 +1829,7 @@
           <a:p>
             <a:fld id="{EC1BCD71-190D-426B-85E9-B8B75E5C9734}" type="datetimeFigureOut">
               <a:rPr lang="en-GB" smtClean="0"/>
-              <a:t>09/08/2023</a:t>
+              <a:t>11/08/2023</a:t>
             </a:fld>
             <a:endParaRPr lang="en-GB"/>
           </a:p>
@@ -1970,7 +1970,7 @@
           <a:p>
             <a:fld id="{EC1BCD71-190D-426B-85E9-B8B75E5C9734}" type="datetimeFigureOut">
               <a:rPr lang="en-GB" smtClean="0"/>
-              <a:t>09/08/2023</a:t>
+              <a:t>11/08/2023</a:t>
             </a:fld>
             <a:endParaRPr lang="en-GB"/>
           </a:p>
@@ -2083,7 +2083,7 @@
           <a:p>
             <a:fld id="{EC1BCD71-190D-426B-85E9-B8B75E5C9734}" type="datetimeFigureOut">
               <a:rPr lang="en-GB" smtClean="0"/>
-              <a:t>09/08/2023</a:t>
+              <a:t>11/08/2023</a:t>
             </a:fld>
             <a:endParaRPr lang="en-GB"/>
           </a:p>
@@ -2394,7 +2394,7 @@
           <a:p>
             <a:fld id="{EC1BCD71-190D-426B-85E9-B8B75E5C9734}" type="datetimeFigureOut">
               <a:rPr lang="en-GB" smtClean="0"/>
-              <a:t>09/08/2023</a:t>
+              <a:t>11/08/2023</a:t>
             </a:fld>
             <a:endParaRPr lang="en-GB"/>
           </a:p>
@@ -2685,7 +2685,7 @@
           <a:p>
             <a:fld id="{EC1BCD71-190D-426B-85E9-B8B75E5C9734}" type="datetimeFigureOut">
               <a:rPr lang="en-GB" smtClean="0"/>
-              <a:t>09/08/2023</a:t>
+              <a:t>11/08/2023</a:t>
             </a:fld>
             <a:endParaRPr lang="en-GB"/>
           </a:p>
@@ -2926,7 +2926,7 @@
           <a:p>
             <a:fld id="{EC1BCD71-190D-426B-85E9-B8B75E5C9734}" type="datetimeFigureOut">
               <a:rPr lang="en-GB" smtClean="0"/>
-              <a:t>09/08/2023</a:t>
+              <a:t>11/08/2023</a:t>
             </a:fld>
             <a:endParaRPr lang="en-GB"/>
           </a:p>
@@ -5686,7 +5686,56 @@
           <a:bodyPr/>
           <a:lstStyle/>
           <a:p>
-            <a:endParaRPr lang="en-GB" dirty="0"/>
+            <a:r>
+              <a:rPr lang="en-GB" dirty="0"/>
+              <a:t>Bug for multi timestep?</a:t>
+            </a:r>
+          </a:p>
+          <a:p>
+            <a:r>
+              <a:rPr lang="en-GB" dirty="0"/>
+              <a:t>Store the simulated z results</a:t>
+            </a:r>
+          </a:p>
+          <a:p>
+            <a:r>
+              <a:rPr lang="en-GB" dirty="0"/>
+              <a:t>Check the performance of either system</a:t>
+            </a:r>
+          </a:p>
+          <a:p>
+            <a:pPr lvl="1"/>
+            <a:r>
+              <a:rPr lang="en-GB" dirty="0"/>
+              <a:t>Checking the [X, </a:t>
+            </a:r>
+            <a:r>
+              <a:rPr lang="en-GB" dirty="0" err="1"/>
+              <a:t>Px</a:t>
+            </a:r>
+            <a:r>
+              <a:rPr lang="en-GB" dirty="0"/>
+              <a:t>] of the graph</a:t>
+            </a:r>
+          </a:p>
+          <a:p>
+            <a:pPr lvl="1"/>
+            <a:r>
+              <a:rPr lang="en-GB"/>
+              <a:t>Optimise </a:t>
+            </a:r>
+            <a:r>
+              <a:rPr lang="en-GB" dirty="0"/>
+              <a:t>it </a:t>
+            </a:r>
+            <a:r>
+              <a:rPr lang="en-GB"/>
+              <a:t>and Compare </a:t>
+            </a:r>
+            <a:r>
+              <a:rPr lang="en-GB" dirty="0"/>
+              <a:t>with the optimal graph</a:t>
+            </a:r>
           </a:p>
         </p:txBody>
       </p:sp>

</xml_diff>